<commit_message>
Modified presentation and notebook for figures.
</commit_message>
<xml_diff>
--- a/project presentation.pptx
+++ b/project presentation.pptx
@@ -5,7 +5,7 @@
     <p:sldMasterId id="2147483648" r:id="rId1"/>
   </p:sldMasterIdLst>
   <p:notesMasterIdLst>
-    <p:notesMasterId r:id="rId12"/>
+    <p:notesMasterId r:id="rId15"/>
   </p:notesMasterIdLst>
   <p:sldIdLst>
     <p:sldId id="256" r:id="rId2"/>
@@ -17,7 +17,10 @@
     <p:sldId id="275" r:id="rId8"/>
     <p:sldId id="276" r:id="rId9"/>
     <p:sldId id="277" r:id="rId10"/>
-    <p:sldId id="278" r:id="rId11"/>
+    <p:sldId id="279" r:id="rId11"/>
+    <p:sldId id="280" r:id="rId12"/>
+    <p:sldId id="281" r:id="rId13"/>
+    <p:sldId id="278" r:id="rId14"/>
   </p:sldIdLst>
   <p:sldSz cx="12192000" cy="6858000"/>
   <p:notesSz cx="6858000" cy="9144000"/>
@@ -206,7 +209,7 @@
           <a:p>
             <a:fld id="{5AB4BEDB-5757-434C-BC4C-F97685D44D9D}" type="datetimeFigureOut">
               <a:rPr lang="en-US" smtClean="0"/>
-              <a:t>12/13/2024</a:t>
+              <a:t>12/14/2024</a:t>
             </a:fld>
             <a:endParaRPr lang="en-US"/>
           </a:p>
@@ -581,6 +584,347 @@
 </p:notes>
 </file>
 
+<file path=ppt/notesSlides/notesSlide10.xml><?xml version="1.0" encoding="utf-8"?>
+<p:notes xmlns:a="http://schemas.openxmlformats.org/drawingml/2006/main" xmlns:r="http://schemas.openxmlformats.org/officeDocument/2006/relationships" xmlns:p="http://schemas.openxmlformats.org/presentationml/2006/main">
+  <p:cSld>
+    <p:spTree>
+      <p:nvGrpSpPr>
+        <p:cNvPr id="1" name="">
+          <a:extLst>
+            <a:ext uri="{FF2B5EF4-FFF2-40B4-BE49-F238E27FC236}">
+              <a16:creationId xmlns:a16="http://schemas.microsoft.com/office/drawing/2014/main" id="{F9433B5C-D0A1-3BA6-1C7D-21E0E32013A1}"/>
+            </a:ext>
+          </a:extLst>
+        </p:cNvPr>
+        <p:cNvGrpSpPr/>
+        <p:nvPr/>
+      </p:nvGrpSpPr>
+      <p:grpSpPr>
+        <a:xfrm>
+          <a:off x="0" y="0"/>
+          <a:ext cx="0" cy="0"/>
+          <a:chOff x="0" y="0"/>
+          <a:chExt cx="0" cy="0"/>
+        </a:xfrm>
+      </p:grpSpPr>
+      <p:sp>
+        <p:nvSpPr>
+          <p:cNvPr id="2" name="Slide Image Placeholder 1">
+            <a:extLst>
+              <a:ext uri="{FF2B5EF4-FFF2-40B4-BE49-F238E27FC236}">
+                <a16:creationId xmlns:a16="http://schemas.microsoft.com/office/drawing/2014/main" id="{4B26DDA0-F736-000C-C1BB-772653D941BF}"/>
+              </a:ext>
+            </a:extLst>
+          </p:cNvPr>
+          <p:cNvSpPr>
+            <a:spLocks noGrp="1" noRot="1" noChangeAspect="1"/>
+          </p:cNvSpPr>
+          <p:nvPr>
+            <p:ph type="sldImg"/>
+          </p:nvPr>
+        </p:nvSpPr>
+        <p:spPr/>
+      </p:sp>
+      <p:sp>
+        <p:nvSpPr>
+          <p:cNvPr id="3" name="Notes Placeholder 2">
+            <a:extLst>
+              <a:ext uri="{FF2B5EF4-FFF2-40B4-BE49-F238E27FC236}">
+                <a16:creationId xmlns:a16="http://schemas.microsoft.com/office/drawing/2014/main" id="{AABE7E42-CBC2-629B-8070-A0D5DBE6562B}"/>
+              </a:ext>
+            </a:extLst>
+          </p:cNvPr>
+          <p:cNvSpPr>
+            <a:spLocks noGrp="1"/>
+          </p:cNvSpPr>
+          <p:nvPr>
+            <p:ph type="body" idx="1"/>
+          </p:nvPr>
+        </p:nvSpPr>
+        <p:spPr/>
+        <p:txBody>
+          <a:bodyPr/>
+          <a:lstStyle/>
+          <a:p>
+            <a:endParaRPr lang="en-US" dirty="0"/>
+          </a:p>
+        </p:txBody>
+      </p:sp>
+      <p:sp>
+        <p:nvSpPr>
+          <p:cNvPr id="4" name="Slide Number Placeholder 3">
+            <a:extLst>
+              <a:ext uri="{FF2B5EF4-FFF2-40B4-BE49-F238E27FC236}">
+                <a16:creationId xmlns:a16="http://schemas.microsoft.com/office/drawing/2014/main" id="{F932C2BD-B1BF-BE50-4705-D647CD625B22}"/>
+              </a:ext>
+            </a:extLst>
+          </p:cNvPr>
+          <p:cNvSpPr>
+            <a:spLocks noGrp="1"/>
+          </p:cNvSpPr>
+          <p:nvPr>
+            <p:ph type="sldNum" sz="quarter" idx="5"/>
+          </p:nvPr>
+        </p:nvSpPr>
+        <p:spPr/>
+        <p:txBody>
+          <a:bodyPr/>
+          <a:lstStyle/>
+          <a:p>
+            <a:fld id="{B158EE29-162F-4494-B21B-338553F98B31}" type="slidenum">
+              <a:rPr lang="en-US" smtClean="0"/>
+              <a:t>11</a:t>
+            </a:fld>
+            <a:endParaRPr lang="en-US"/>
+          </a:p>
+        </p:txBody>
+      </p:sp>
+    </p:spTree>
+    <p:extLst>
+      <p:ext uri="{BB962C8B-B14F-4D97-AF65-F5344CB8AC3E}">
+        <p14:creationId xmlns:p14="http://schemas.microsoft.com/office/powerpoint/2010/main" val="3427808819"/>
+      </p:ext>
+    </p:extLst>
+  </p:cSld>
+  <p:clrMapOvr>
+    <a:masterClrMapping/>
+  </p:clrMapOvr>
+</p:notes>
+</file>
+
+<file path=ppt/notesSlides/notesSlide11.xml><?xml version="1.0" encoding="utf-8"?>
+<p:notes xmlns:a="http://schemas.openxmlformats.org/drawingml/2006/main" xmlns:r="http://schemas.openxmlformats.org/officeDocument/2006/relationships" xmlns:p="http://schemas.openxmlformats.org/presentationml/2006/main">
+  <p:cSld>
+    <p:spTree>
+      <p:nvGrpSpPr>
+        <p:cNvPr id="1" name="">
+          <a:extLst>
+            <a:ext uri="{FF2B5EF4-FFF2-40B4-BE49-F238E27FC236}">
+              <a16:creationId xmlns:a16="http://schemas.microsoft.com/office/drawing/2014/main" id="{9DF929BF-F0BC-DF8F-C746-60D475F6F950}"/>
+            </a:ext>
+          </a:extLst>
+        </p:cNvPr>
+        <p:cNvGrpSpPr/>
+        <p:nvPr/>
+      </p:nvGrpSpPr>
+      <p:grpSpPr>
+        <a:xfrm>
+          <a:off x="0" y="0"/>
+          <a:ext cx="0" cy="0"/>
+          <a:chOff x="0" y="0"/>
+          <a:chExt cx="0" cy="0"/>
+        </a:xfrm>
+      </p:grpSpPr>
+      <p:sp>
+        <p:nvSpPr>
+          <p:cNvPr id="2" name="Slide Image Placeholder 1">
+            <a:extLst>
+              <a:ext uri="{FF2B5EF4-FFF2-40B4-BE49-F238E27FC236}">
+                <a16:creationId xmlns:a16="http://schemas.microsoft.com/office/drawing/2014/main" id="{D1170599-9C98-2E74-CC09-8C8A6AA3EE93}"/>
+              </a:ext>
+            </a:extLst>
+          </p:cNvPr>
+          <p:cNvSpPr>
+            <a:spLocks noGrp="1" noRot="1" noChangeAspect="1"/>
+          </p:cNvSpPr>
+          <p:nvPr>
+            <p:ph type="sldImg"/>
+          </p:nvPr>
+        </p:nvSpPr>
+        <p:spPr/>
+      </p:sp>
+      <p:sp>
+        <p:nvSpPr>
+          <p:cNvPr id="3" name="Notes Placeholder 2">
+            <a:extLst>
+              <a:ext uri="{FF2B5EF4-FFF2-40B4-BE49-F238E27FC236}">
+                <a16:creationId xmlns:a16="http://schemas.microsoft.com/office/drawing/2014/main" id="{B18E9784-860B-C874-0E7C-E75C9E6AB3A6}"/>
+              </a:ext>
+            </a:extLst>
+          </p:cNvPr>
+          <p:cNvSpPr>
+            <a:spLocks noGrp="1"/>
+          </p:cNvSpPr>
+          <p:nvPr>
+            <p:ph type="body" idx="1"/>
+          </p:nvPr>
+        </p:nvSpPr>
+        <p:spPr/>
+        <p:txBody>
+          <a:bodyPr/>
+          <a:lstStyle/>
+          <a:p>
+            <a:pPr marL="171450" indent="-171450">
+              <a:buFontTx/>
+              <a:buChar char="-"/>
+            </a:pPr>
+            <a:r>
+              <a:rPr lang="en-US" dirty="0"/>
+              <a:t>This helps demonstrate the robustness of the classifier model in general. Even when flipping 75% of the labels in our subset we are only able to misclassify 1% of examples. </a:t>
+            </a:r>
+          </a:p>
+          <a:p>
+            <a:pPr marL="171450" indent="-171450">
+              <a:buFontTx/>
+              <a:buChar char="-"/>
+            </a:pPr>
+            <a:r>
+              <a:rPr lang="en-US" dirty="0"/>
+              <a:t>This might indicate that this specific task may never be affected by pre-training because there are so many examples for the classifier. </a:t>
+            </a:r>
+          </a:p>
+        </p:txBody>
+      </p:sp>
+      <p:sp>
+        <p:nvSpPr>
+          <p:cNvPr id="4" name="Slide Number Placeholder 3">
+            <a:extLst>
+              <a:ext uri="{FF2B5EF4-FFF2-40B4-BE49-F238E27FC236}">
+                <a16:creationId xmlns:a16="http://schemas.microsoft.com/office/drawing/2014/main" id="{DCC26EA2-B148-6D0E-9FB0-F48FC49695BB}"/>
+              </a:ext>
+            </a:extLst>
+          </p:cNvPr>
+          <p:cNvSpPr>
+            <a:spLocks noGrp="1"/>
+          </p:cNvSpPr>
+          <p:nvPr>
+            <p:ph type="sldNum" sz="quarter" idx="5"/>
+          </p:nvPr>
+        </p:nvSpPr>
+        <p:spPr/>
+        <p:txBody>
+          <a:bodyPr/>
+          <a:lstStyle/>
+          <a:p>
+            <a:fld id="{B158EE29-162F-4494-B21B-338553F98B31}" type="slidenum">
+              <a:rPr lang="en-US" smtClean="0"/>
+              <a:t>12</a:t>
+            </a:fld>
+            <a:endParaRPr lang="en-US"/>
+          </a:p>
+        </p:txBody>
+      </p:sp>
+    </p:spTree>
+    <p:extLst>
+      <p:ext uri="{BB962C8B-B14F-4D97-AF65-F5344CB8AC3E}">
+        <p14:creationId xmlns:p14="http://schemas.microsoft.com/office/powerpoint/2010/main" val="2011102997"/>
+      </p:ext>
+    </p:extLst>
+  </p:cSld>
+  <p:clrMapOvr>
+    <a:masterClrMapping/>
+  </p:clrMapOvr>
+</p:notes>
+</file>
+
+<file path=ppt/notesSlides/notesSlide12.xml><?xml version="1.0" encoding="utf-8"?>
+<p:notes xmlns:a="http://schemas.openxmlformats.org/drawingml/2006/main" xmlns:r="http://schemas.openxmlformats.org/officeDocument/2006/relationships" xmlns:p="http://schemas.openxmlformats.org/presentationml/2006/main">
+  <p:cSld>
+    <p:spTree>
+      <p:nvGrpSpPr>
+        <p:cNvPr id="1" name="">
+          <a:extLst>
+            <a:ext uri="{FF2B5EF4-FFF2-40B4-BE49-F238E27FC236}">
+              <a16:creationId xmlns:a16="http://schemas.microsoft.com/office/drawing/2014/main" id="{BA898E36-558E-4C66-BBFA-21403413147C}"/>
+            </a:ext>
+          </a:extLst>
+        </p:cNvPr>
+        <p:cNvGrpSpPr/>
+        <p:nvPr/>
+      </p:nvGrpSpPr>
+      <p:grpSpPr>
+        <a:xfrm>
+          <a:off x="0" y="0"/>
+          <a:ext cx="0" cy="0"/>
+          <a:chOff x="0" y="0"/>
+          <a:chExt cx="0" cy="0"/>
+        </a:xfrm>
+      </p:grpSpPr>
+      <p:sp>
+        <p:nvSpPr>
+          <p:cNvPr id="2" name="Slide Image Placeholder 1">
+            <a:extLst>
+              <a:ext uri="{FF2B5EF4-FFF2-40B4-BE49-F238E27FC236}">
+                <a16:creationId xmlns:a16="http://schemas.microsoft.com/office/drawing/2014/main" id="{E1EF0AFB-0FC1-F409-F23C-638B26513181}"/>
+              </a:ext>
+            </a:extLst>
+          </p:cNvPr>
+          <p:cNvSpPr>
+            <a:spLocks noGrp="1" noRot="1" noChangeAspect="1"/>
+          </p:cNvSpPr>
+          <p:nvPr>
+            <p:ph type="sldImg"/>
+          </p:nvPr>
+        </p:nvSpPr>
+        <p:spPr/>
+      </p:sp>
+      <p:sp>
+        <p:nvSpPr>
+          <p:cNvPr id="3" name="Notes Placeholder 2">
+            <a:extLst>
+              <a:ext uri="{FF2B5EF4-FFF2-40B4-BE49-F238E27FC236}">
+                <a16:creationId xmlns:a16="http://schemas.microsoft.com/office/drawing/2014/main" id="{4BDDFF1D-D5D3-7E98-2D19-ADBD9CC1B70D}"/>
+              </a:ext>
+            </a:extLst>
+          </p:cNvPr>
+          <p:cNvSpPr>
+            <a:spLocks noGrp="1"/>
+          </p:cNvSpPr>
+          <p:nvPr>
+            <p:ph type="body" idx="1"/>
+          </p:nvPr>
+        </p:nvSpPr>
+        <p:spPr/>
+        <p:txBody>
+          <a:bodyPr/>
+          <a:lstStyle/>
+          <a:p>
+            <a:endParaRPr lang="en-US" dirty="0"/>
+          </a:p>
+        </p:txBody>
+      </p:sp>
+      <p:sp>
+        <p:nvSpPr>
+          <p:cNvPr id="4" name="Slide Number Placeholder 3">
+            <a:extLst>
+              <a:ext uri="{FF2B5EF4-FFF2-40B4-BE49-F238E27FC236}">
+                <a16:creationId xmlns:a16="http://schemas.microsoft.com/office/drawing/2014/main" id="{37CC87EB-FED6-67AF-5EB5-758BCCC69031}"/>
+              </a:ext>
+            </a:extLst>
+          </p:cNvPr>
+          <p:cNvSpPr>
+            <a:spLocks noGrp="1"/>
+          </p:cNvSpPr>
+          <p:nvPr>
+            <p:ph type="sldNum" sz="quarter" idx="5"/>
+          </p:nvPr>
+        </p:nvSpPr>
+        <p:spPr/>
+        <p:txBody>
+          <a:bodyPr/>
+          <a:lstStyle/>
+          <a:p>
+            <a:fld id="{B158EE29-162F-4494-B21B-338553F98B31}" type="slidenum">
+              <a:rPr lang="en-US" smtClean="0"/>
+              <a:t>13</a:t>
+            </a:fld>
+            <a:endParaRPr lang="en-US"/>
+          </a:p>
+        </p:txBody>
+      </p:sp>
+    </p:spTree>
+    <p:extLst>
+      <p:ext uri="{BB962C8B-B14F-4D97-AF65-F5344CB8AC3E}">
+        <p14:creationId xmlns:p14="http://schemas.microsoft.com/office/powerpoint/2010/main" val="595097956"/>
+      </p:ext>
+    </p:extLst>
+  </p:cSld>
+  <p:clrMapOvr>
+    <a:masterClrMapping/>
+  </p:clrMapOvr>
+</p:notes>
+</file>
+
 <file path=ppt/notesSlides/notesSlide2.xml><?xml version="1.0" encoding="utf-8"?>
 <p:notes xmlns:a="http://schemas.openxmlformats.org/drawingml/2006/main" xmlns:r="http://schemas.openxmlformats.org/officeDocument/2006/relationships" xmlns:p="http://schemas.openxmlformats.org/presentationml/2006/main">
   <p:cSld>
@@ -1488,7 +1832,7 @@
         <p:cNvPr id="1" name="">
           <a:extLst>
             <a:ext uri="{FF2B5EF4-FFF2-40B4-BE49-F238E27FC236}">
-              <a16:creationId xmlns:a16="http://schemas.microsoft.com/office/drawing/2014/main" id="{BA898E36-558E-4C66-BBFA-21403413147C}"/>
+              <a16:creationId xmlns:a16="http://schemas.microsoft.com/office/drawing/2014/main" id="{81C1C796-6395-BA51-E236-F0DF93E3C698}"/>
             </a:ext>
           </a:extLst>
         </p:cNvPr>
@@ -1508,7 +1852,7 @@
           <p:cNvPr id="2" name="Slide Image Placeholder 1">
             <a:extLst>
               <a:ext uri="{FF2B5EF4-FFF2-40B4-BE49-F238E27FC236}">
-                <a16:creationId xmlns:a16="http://schemas.microsoft.com/office/drawing/2014/main" id="{E1EF0AFB-0FC1-F409-F23C-638B26513181}"/>
+                <a16:creationId xmlns:a16="http://schemas.microsoft.com/office/drawing/2014/main" id="{C3D66A2B-30E1-F228-1148-9EFC5A9686A5}"/>
               </a:ext>
             </a:extLst>
           </p:cNvPr>
@@ -1526,7 +1870,7 @@
           <p:cNvPr id="3" name="Notes Placeholder 2">
             <a:extLst>
               <a:ext uri="{FF2B5EF4-FFF2-40B4-BE49-F238E27FC236}">
-                <a16:creationId xmlns:a16="http://schemas.microsoft.com/office/drawing/2014/main" id="{4BDDFF1D-D5D3-7E98-2D19-ADBD9CC1B70D}"/>
+                <a16:creationId xmlns:a16="http://schemas.microsoft.com/office/drawing/2014/main" id="{977857B0-C7B6-5737-B460-E51C0354B165}"/>
               </a:ext>
             </a:extLst>
           </p:cNvPr>
@@ -1542,7 +1886,31 @@
           <a:bodyPr/>
           <a:lstStyle/>
           <a:p>
-            <a:endParaRPr lang="en-US" dirty="0"/>
+            <a:pPr marL="228600" indent="-228600">
+              <a:buAutoNum type="arabicPeriod"/>
+            </a:pPr>
+            <a:r>
+              <a:rPr lang="en-US" dirty="0"/>
+              <a:t>It is possible that we just didn’t add enough new example to change the original BERT embedding sufficiently. Unlikely purely a numbers issue as ~ 20,000 new examples were added for the Fake New and random work sampling corpuses. </a:t>
+            </a:r>
+          </a:p>
+          <a:p>
+            <a:pPr marL="228600" indent="-228600">
+              <a:buAutoNum type="arabicPeriod"/>
+            </a:pPr>
+            <a:r>
+              <a:rPr lang="en-US" dirty="0"/>
+              <a:t>This problem is likely true. In order to effect, the downstream model we really needed to change word embeddings a lot. We probably need more specific targeting, but these may be infeasible or impractical to actually implement.</a:t>
+            </a:r>
+          </a:p>
+          <a:p>
+            <a:pPr marL="228600" indent="-228600">
+              <a:buAutoNum type="arabicPeriod"/>
+            </a:pPr>
+            <a:r>
+              <a:rPr lang="en-US" dirty="0"/>
+              <a:t>Another potential problem that the problems lie with the classification model and has nothing to do with the pre-training. A model fine-tuned on over 40,000 labeled examples is sure to find a good binary classification boundary even if the original pre-trained embeddings are messed up. </a:t>
+            </a:r>
           </a:p>
         </p:txBody>
       </p:sp>
@@ -1551,7 +1919,7 @@
           <p:cNvPr id="4" name="Slide Number Placeholder 3">
             <a:extLst>
               <a:ext uri="{FF2B5EF4-FFF2-40B4-BE49-F238E27FC236}">
-                <a16:creationId xmlns:a16="http://schemas.microsoft.com/office/drawing/2014/main" id="{37CC87EB-FED6-67AF-5EB5-758BCCC69031}"/>
+                <a16:creationId xmlns:a16="http://schemas.microsoft.com/office/drawing/2014/main" id="{939E24F9-144F-C166-F7C4-853395485268}"/>
               </a:ext>
             </a:extLst>
           </p:cNvPr>
@@ -1578,7 +1946,7 @@
     </p:spTree>
     <p:extLst>
       <p:ext uri="{BB962C8B-B14F-4D97-AF65-F5344CB8AC3E}">
-        <p14:creationId xmlns:p14="http://schemas.microsoft.com/office/powerpoint/2010/main" val="595097956"/>
+        <p14:creationId xmlns:p14="http://schemas.microsoft.com/office/powerpoint/2010/main" val="2231009335"/>
       </p:ext>
     </p:extLst>
   </p:cSld>
@@ -1735,7 +2103,7 @@
           <a:p>
             <a:fld id="{12F308D4-E5B5-4A97-999F-41A1404DE40B}" type="datetimeFigureOut">
               <a:rPr lang="en-US" smtClean="0"/>
-              <a:t>12/13/2024</a:t>
+              <a:t>12/14/2024</a:t>
             </a:fld>
             <a:endParaRPr lang="en-US"/>
           </a:p>
@@ -1933,7 +2301,7 @@
           <a:p>
             <a:fld id="{12F308D4-E5B5-4A97-999F-41A1404DE40B}" type="datetimeFigureOut">
               <a:rPr lang="en-US" smtClean="0"/>
-              <a:t>12/13/2024</a:t>
+              <a:t>12/14/2024</a:t>
             </a:fld>
             <a:endParaRPr lang="en-US"/>
           </a:p>
@@ -2141,7 +2509,7 @@
           <a:p>
             <a:fld id="{12F308D4-E5B5-4A97-999F-41A1404DE40B}" type="datetimeFigureOut">
               <a:rPr lang="en-US" smtClean="0"/>
-              <a:t>12/13/2024</a:t>
+              <a:t>12/14/2024</a:t>
             </a:fld>
             <a:endParaRPr lang="en-US"/>
           </a:p>
@@ -2339,7 +2707,7 @@
           <a:p>
             <a:fld id="{12F308D4-E5B5-4A97-999F-41A1404DE40B}" type="datetimeFigureOut">
               <a:rPr lang="en-US" smtClean="0"/>
-              <a:t>12/13/2024</a:t>
+              <a:t>12/14/2024</a:t>
             </a:fld>
             <a:endParaRPr lang="en-US"/>
           </a:p>
@@ -2614,7 +2982,7 @@
           <a:p>
             <a:fld id="{12F308D4-E5B5-4A97-999F-41A1404DE40B}" type="datetimeFigureOut">
               <a:rPr lang="en-US" smtClean="0"/>
-              <a:t>12/13/2024</a:t>
+              <a:t>12/14/2024</a:t>
             </a:fld>
             <a:endParaRPr lang="en-US"/>
           </a:p>
@@ -2879,7 +3247,7 @@
           <a:p>
             <a:fld id="{12F308D4-E5B5-4A97-999F-41A1404DE40B}" type="datetimeFigureOut">
               <a:rPr lang="en-US" smtClean="0"/>
-              <a:t>12/13/2024</a:t>
+              <a:t>12/14/2024</a:t>
             </a:fld>
             <a:endParaRPr lang="en-US"/>
           </a:p>
@@ -3291,7 +3659,7 @@
           <a:p>
             <a:fld id="{12F308D4-E5B5-4A97-999F-41A1404DE40B}" type="datetimeFigureOut">
               <a:rPr lang="en-US" smtClean="0"/>
-              <a:t>12/13/2024</a:t>
+              <a:t>12/14/2024</a:t>
             </a:fld>
             <a:endParaRPr lang="en-US"/>
           </a:p>
@@ -3432,7 +3800,7 @@
           <a:p>
             <a:fld id="{12F308D4-E5B5-4A97-999F-41A1404DE40B}" type="datetimeFigureOut">
               <a:rPr lang="en-US" smtClean="0"/>
-              <a:t>12/13/2024</a:t>
+              <a:t>12/14/2024</a:t>
             </a:fld>
             <a:endParaRPr lang="en-US"/>
           </a:p>
@@ -3545,7 +3913,7 @@
           <a:p>
             <a:fld id="{12F308D4-E5B5-4A97-999F-41A1404DE40B}" type="datetimeFigureOut">
               <a:rPr lang="en-US" smtClean="0"/>
-              <a:t>12/13/2024</a:t>
+              <a:t>12/14/2024</a:t>
             </a:fld>
             <a:endParaRPr lang="en-US"/>
           </a:p>
@@ -3856,7 +4224,7 @@
           <a:p>
             <a:fld id="{12F308D4-E5B5-4A97-999F-41A1404DE40B}" type="datetimeFigureOut">
               <a:rPr lang="en-US" smtClean="0"/>
-              <a:t>12/13/2024</a:t>
+              <a:t>12/14/2024</a:t>
             </a:fld>
             <a:endParaRPr lang="en-US"/>
           </a:p>
@@ -4144,7 +4512,7 @@
           <a:p>
             <a:fld id="{12F308D4-E5B5-4A97-999F-41A1404DE40B}" type="datetimeFigureOut">
               <a:rPr lang="en-US" smtClean="0"/>
-              <a:t>12/13/2024</a:t>
+              <a:t>12/14/2024</a:t>
             </a:fld>
             <a:endParaRPr lang="en-US"/>
           </a:p>
@@ -4385,7 +4753,7 @@
           <a:p>
             <a:fld id="{12F308D4-E5B5-4A97-999F-41A1404DE40B}" type="datetimeFigureOut">
               <a:rPr lang="en-US" smtClean="0"/>
-              <a:t>12/13/2024</a:t>
+              <a:t>12/14/2024</a:t>
             </a:fld>
             <a:endParaRPr lang="en-US"/>
           </a:p>
@@ -4941,7 +5309,7 @@
         <p:cNvPr id="1" name="">
           <a:extLst>
             <a:ext uri="{FF2B5EF4-FFF2-40B4-BE49-F238E27FC236}">
-              <a16:creationId xmlns:a16="http://schemas.microsoft.com/office/drawing/2014/main" id="{AA045A3B-F4A8-FD0A-C81A-05DC1801D824}"/>
+              <a16:creationId xmlns:a16="http://schemas.microsoft.com/office/drawing/2014/main" id="{F776D6E6-10CD-2741-692F-7D6B79B1B876}"/>
             </a:ext>
           </a:extLst>
         </p:cNvPr>
@@ -4961,7 +5329,7 @@
           <p:cNvPr id="4" name="Flowchart: Alternate Process 3">
             <a:extLst>
               <a:ext uri="{FF2B5EF4-FFF2-40B4-BE49-F238E27FC236}">
-                <a16:creationId xmlns:a16="http://schemas.microsoft.com/office/drawing/2014/main" id="{45AE1CE2-D135-21B7-133E-80AAEA33FCD1}"/>
+                <a16:creationId xmlns:a16="http://schemas.microsoft.com/office/drawing/2014/main" id="{86170A89-26CC-1AD9-4C29-17950ADC02C6}"/>
               </a:ext>
             </a:extLst>
           </p:cNvPr>
@@ -5011,7 +5379,7 @@
           <p:cNvPr id="2" name="TextBox 1">
             <a:extLst>
               <a:ext uri="{FF2B5EF4-FFF2-40B4-BE49-F238E27FC236}">
-                <a16:creationId xmlns:a16="http://schemas.microsoft.com/office/drawing/2014/main" id="{BE40BDDB-8AFD-7F5B-6160-EF634F79D653}"/>
+                <a16:creationId xmlns:a16="http://schemas.microsoft.com/office/drawing/2014/main" id="{9B40ABC5-6476-0294-1ECE-B667B56AF420}"/>
               </a:ext>
             </a:extLst>
           </p:cNvPr>
@@ -5045,7 +5413,7 @@
                 <a:latin typeface="Times New Roman" panose="02020603050405020304" pitchFamily="18" charset="0"/>
                 <a:cs typeface="Times New Roman" panose="02020603050405020304" pitchFamily="18" charset="0"/>
               </a:rPr>
-              <a:t>6. Conclusion</a:t>
+              <a:t>6. Discussion </a:t>
             </a:r>
           </a:p>
         </p:txBody>
@@ -5055,7 +5423,7 @@
           <p:cNvPr id="11" name="TextBox 10">
             <a:extLst>
               <a:ext uri="{FF2B5EF4-FFF2-40B4-BE49-F238E27FC236}">
-                <a16:creationId xmlns:a16="http://schemas.microsoft.com/office/drawing/2014/main" id="{9F2B87C2-23AC-C8A1-8A38-AE716785EA16}"/>
+                <a16:creationId xmlns:a16="http://schemas.microsoft.com/office/drawing/2014/main" id="{C642AE32-4ABA-3E14-814D-978DDEC1B561}"/>
               </a:ext>
             </a:extLst>
           </p:cNvPr>
@@ -5064,8 +5432,8 @@
         </p:nvSpPr>
         <p:spPr>
           <a:xfrm>
-            <a:off x="679939" y="1745012"/>
-            <a:ext cx="10245968" cy="4385816"/>
+            <a:off x="855785" y="1909135"/>
+            <a:ext cx="10245968" cy="2446824"/>
           </a:xfrm>
           <a:prstGeom prst="rect">
             <a:avLst/>
@@ -5078,40 +5446,6 @@
           </a:bodyPr>
           <a:lstStyle/>
           <a:p>
-            <a:pPr marL="285750" indent="-285750">
-              <a:buFont typeface="Arial" panose="020B0604020202020204" pitchFamily="34" charset="0"/>
-              <a:buChar char="•"/>
-            </a:pPr>
-            <a:r>
-              <a:rPr lang="en-US" dirty="0"/>
-              <a:t>Our findings highlight the resilience of fine-tuned BERT models against biased data. Despite various attempts to manipulate its predictions by using synthetic data or targeted pre-training, the model maintained high accuracy in distinguishing fake news from real news. This suggests that the model’s representations are distributed and robust, making them less susceptible to superficial modifications in the data.</a:t>
-            </a:r>
-          </a:p>
-          <a:p>
-            <a:pPr marL="285750" indent="-285750">
-              <a:buFont typeface="Arial" panose="020B0604020202020204" pitchFamily="34" charset="0"/>
-              <a:buChar char="•"/>
-            </a:pPr>
-            <a:endParaRPr lang="en-US" dirty="0"/>
-          </a:p>
-          <a:p>
-            <a:pPr marL="285750" indent="-285750">
-              <a:buFont typeface="Arial" panose="020B0604020202020204" pitchFamily="34" charset="0"/>
-              <a:buChar char="•"/>
-            </a:pPr>
-            <a:endParaRPr lang="en-US" dirty="0"/>
-          </a:p>
-          <a:p>
-            <a:pPr marL="285750" indent="-285750">
-              <a:buFont typeface="Arial" panose="020B0604020202020204" pitchFamily="34" charset="0"/>
-              <a:buChar char="•"/>
-            </a:pPr>
-            <a:r>
-              <a:rPr lang="en-US" dirty="0"/>
-              <a:t>Potential directions for future research:</a:t>
-            </a:r>
-          </a:p>
-          <a:p>
             <a:pPr marL="742950" lvl="1" indent="-285750">
               <a:lnSpc>
                 <a:spcPct val="150000"/>
@@ -5121,15 +5455,1314 @@
             </a:pPr>
             <a:r>
               <a:rPr lang="en-US" dirty="0"/>
-              <a:t>Explore whether training on synthetic datasets would change the embeddings of news vectors</a:t>
-            </a:r>
-          </a:p>
-          <a:p>
-            <a:pPr marL="285750" indent="-285750">
+              <a:t>Potential Reasons for No Change in Accuracy:</a:t>
+            </a:r>
+          </a:p>
+          <a:p>
+            <a:pPr marL="1257300" lvl="2" indent="-342900">
+              <a:lnSpc>
+                <a:spcPct val="150000"/>
+              </a:lnSpc>
+              <a:buFont typeface="+mj-lt"/>
+              <a:buAutoNum type="arabicPeriod"/>
+            </a:pPr>
+            <a:r>
+              <a:rPr lang="en-US" dirty="0"/>
+              <a:t>The biased corpus is too small. </a:t>
+            </a:r>
+          </a:p>
+          <a:p>
+            <a:pPr marL="1257300" lvl="2" indent="-342900">
+              <a:lnSpc>
+                <a:spcPct val="150000"/>
+              </a:lnSpc>
+              <a:buFont typeface="+mj-lt"/>
+              <a:buAutoNum type="arabicPeriod"/>
+            </a:pPr>
+            <a:r>
+              <a:rPr lang="en-US" dirty="0"/>
+              <a:t>The bias is not strong enough. </a:t>
+            </a:r>
+          </a:p>
+          <a:p>
+            <a:pPr marL="1257300" lvl="2" indent="-342900">
+              <a:lnSpc>
+                <a:spcPct val="150000"/>
+              </a:lnSpc>
+              <a:buFont typeface="+mj-lt"/>
+              <a:buAutoNum type="arabicPeriod"/>
+            </a:pPr>
+            <a:r>
+              <a:rPr lang="en-US" dirty="0"/>
+              <a:t>The classification corpus is too large. </a:t>
+            </a:r>
+          </a:p>
+          <a:p>
+            <a:pPr marL="1257300" lvl="2" indent="-342900">
+              <a:lnSpc>
+                <a:spcPct val="150000"/>
+              </a:lnSpc>
+              <a:buFont typeface="+mj-lt"/>
+              <a:buAutoNum type="arabicPeriod"/>
+            </a:pPr>
+            <a:endParaRPr lang="en-US" dirty="0"/>
+          </a:p>
+          <a:p>
+            <a:pPr marL="1257300" lvl="2" indent="-342900">
+              <a:buFont typeface="+mj-lt"/>
+              <a:buAutoNum type="arabicPeriod"/>
+            </a:pPr>
+            <a:endParaRPr lang="en-US" dirty="0"/>
+          </a:p>
+        </p:txBody>
+      </p:sp>
+    </p:spTree>
+    <p:extLst>
+      <p:ext uri="{BB962C8B-B14F-4D97-AF65-F5344CB8AC3E}">
+        <p14:creationId xmlns:p14="http://schemas.microsoft.com/office/powerpoint/2010/main" val="1054306201"/>
+      </p:ext>
+    </p:extLst>
+  </p:cSld>
+  <p:clrMapOvr>
+    <a:masterClrMapping/>
+  </p:clrMapOvr>
+</p:sld>
+</file>
+
+<file path=ppt/slides/slide11.xml><?xml version="1.0" encoding="utf-8"?>
+<p:sld xmlns:a="http://schemas.openxmlformats.org/drawingml/2006/main" xmlns:r="http://schemas.openxmlformats.org/officeDocument/2006/relationships" xmlns:p="http://schemas.openxmlformats.org/presentationml/2006/main">
+  <p:cSld>
+    <p:spTree>
+      <p:nvGrpSpPr>
+        <p:cNvPr id="1" name="">
+          <a:extLst>
+            <a:ext uri="{FF2B5EF4-FFF2-40B4-BE49-F238E27FC236}">
+              <a16:creationId xmlns:a16="http://schemas.microsoft.com/office/drawing/2014/main" id="{A211ED11-5FFB-9716-FF7D-9698E8B648C3}"/>
+            </a:ext>
+          </a:extLst>
+        </p:cNvPr>
+        <p:cNvGrpSpPr/>
+        <p:nvPr/>
+      </p:nvGrpSpPr>
+      <p:grpSpPr>
+        <a:xfrm>
+          <a:off x="0" y="0"/>
+          <a:ext cx="0" cy="0"/>
+          <a:chOff x="0" y="0"/>
+          <a:chExt cx="0" cy="0"/>
+        </a:xfrm>
+      </p:grpSpPr>
+      <p:sp>
+        <p:nvSpPr>
+          <p:cNvPr id="4" name="Flowchart: Alternate Process 3">
+            <a:extLst>
+              <a:ext uri="{FF2B5EF4-FFF2-40B4-BE49-F238E27FC236}">
+                <a16:creationId xmlns:a16="http://schemas.microsoft.com/office/drawing/2014/main" id="{BC459EF9-025F-F2C4-0D46-098B7E395163}"/>
+              </a:ext>
+            </a:extLst>
+          </p:cNvPr>
+          <p:cNvSpPr/>
+          <p:nvPr/>
+        </p:nvSpPr>
+        <p:spPr>
+          <a:xfrm>
+            <a:off x="-103632" y="1133856"/>
+            <a:ext cx="12399264" cy="100584"/>
+          </a:xfrm>
+          <a:prstGeom prst="flowChartAlternateProcess">
+            <a:avLst/>
+          </a:prstGeom>
+          <a:solidFill>
+            <a:schemeClr val="tx2">
+              <a:lumMod val="75000"/>
+              <a:lumOff val="25000"/>
+            </a:schemeClr>
+          </a:solidFill>
+        </p:spPr>
+        <p:style>
+          <a:lnRef idx="3">
+            <a:schemeClr val="lt1"/>
+          </a:lnRef>
+          <a:fillRef idx="1">
+            <a:schemeClr val="accent1"/>
+          </a:fillRef>
+          <a:effectRef idx="1">
+            <a:schemeClr val="accent1"/>
+          </a:effectRef>
+          <a:fontRef idx="minor">
+            <a:schemeClr val="lt1"/>
+          </a:fontRef>
+        </p:style>
+        <p:txBody>
+          <a:bodyPr rtlCol="0" anchor="ctr"/>
+          <a:lstStyle/>
+          <a:p>
+            <a:pPr algn="ctr"/>
+            <a:endParaRPr lang="en-US"/>
+          </a:p>
+        </p:txBody>
+      </p:sp>
+      <p:sp>
+        <p:nvSpPr>
+          <p:cNvPr id="2" name="TextBox 1">
+            <a:extLst>
+              <a:ext uri="{FF2B5EF4-FFF2-40B4-BE49-F238E27FC236}">
+                <a16:creationId xmlns:a16="http://schemas.microsoft.com/office/drawing/2014/main" id="{6C0CB101-75D2-E812-D918-E7089AC87F84}"/>
+              </a:ext>
+            </a:extLst>
+          </p:cNvPr>
+          <p:cNvSpPr txBox="1"/>
+          <p:nvPr/>
+        </p:nvSpPr>
+        <p:spPr>
+          <a:xfrm>
+            <a:off x="310895" y="385048"/>
+            <a:ext cx="9196519" cy="707886"/>
+          </a:xfrm>
+          <a:prstGeom prst="rect">
+            <a:avLst/>
+          </a:prstGeom>
+          <a:noFill/>
+        </p:spPr>
+        <p:txBody>
+          <a:bodyPr wrap="square" rtlCol="0">
+            <a:spAutoFit/>
+          </a:bodyPr>
+          <a:lstStyle/>
+          <a:p>
+            <a:r>
+              <a:rPr lang="en-US" sz="4000" dirty="0">
+                <a:solidFill>
+                  <a:schemeClr val="tx2">
+                    <a:lumMod val="75000"/>
+                    <a:lumOff val="25000"/>
+                  </a:schemeClr>
+                </a:solidFill>
+                <a:latin typeface="Times New Roman" panose="02020603050405020304" pitchFamily="18" charset="0"/>
+                <a:cs typeface="Times New Roman" panose="02020603050405020304" pitchFamily="18" charset="0"/>
+              </a:rPr>
+              <a:t>6. Discussion </a:t>
+            </a:r>
+          </a:p>
+        </p:txBody>
+      </p:sp>
+      <p:grpSp>
+        <p:nvGrpSpPr>
+          <p:cNvPr id="30" name="Group 29">
+            <a:extLst>
+              <a:ext uri="{FF2B5EF4-FFF2-40B4-BE49-F238E27FC236}">
+                <a16:creationId xmlns:a16="http://schemas.microsoft.com/office/drawing/2014/main" id="{14038BEA-8C37-5939-2637-C996FD30A080}"/>
+              </a:ext>
+            </a:extLst>
+          </p:cNvPr>
+          <p:cNvGrpSpPr/>
+          <p:nvPr/>
+        </p:nvGrpSpPr>
+        <p:grpSpPr>
+          <a:xfrm>
+            <a:off x="813174" y="1341562"/>
+            <a:ext cx="10565652" cy="5131390"/>
+            <a:chOff x="310895" y="1341562"/>
+            <a:chExt cx="10565652" cy="5131390"/>
+          </a:xfrm>
+        </p:grpSpPr>
+        <p:sp>
+          <p:nvSpPr>
+            <p:cNvPr id="25" name="TextBox 24">
+              <a:extLst>
+                <a:ext uri="{FF2B5EF4-FFF2-40B4-BE49-F238E27FC236}">
+                  <a16:creationId xmlns:a16="http://schemas.microsoft.com/office/drawing/2014/main" id="{3812D2D5-C3D8-B02F-D4E4-3BB2454DCD04}"/>
+                </a:ext>
+              </a:extLst>
+            </p:cNvPr>
+            <p:cNvSpPr txBox="1"/>
+            <p:nvPr/>
+          </p:nvSpPr>
+          <p:spPr>
+            <a:xfrm>
+              <a:off x="6330537" y="3077897"/>
+              <a:ext cx="4546010" cy="369332"/>
+            </a:xfrm>
+            <a:prstGeom prst="rect">
+              <a:avLst/>
+            </a:prstGeom>
+            <a:noFill/>
+          </p:spPr>
+          <p:txBody>
+            <a:bodyPr wrap="square">
+              <a:spAutoFit/>
+            </a:bodyPr>
+            <a:lstStyle/>
+            <a:p>
+              <a:pPr lvl="1"/>
+              <a:r>
+                <a:rPr lang="en-US" dirty="0"/>
+                <a:t>Real New Article + Twitter Key Words</a:t>
+              </a:r>
+            </a:p>
+          </p:txBody>
+        </p:sp>
+        <p:pic>
+          <p:nvPicPr>
+            <p:cNvPr id="5" name="Picture 4">
+              <a:extLst>
+                <a:ext uri="{FF2B5EF4-FFF2-40B4-BE49-F238E27FC236}">
+                  <a16:creationId xmlns:a16="http://schemas.microsoft.com/office/drawing/2014/main" id="{11793D61-A24D-CA73-B40F-ACB9C31F26BD}"/>
+                </a:ext>
+              </a:extLst>
+            </p:cNvPr>
+            <p:cNvPicPr>
+              <a:picLocks noChangeAspect="1"/>
+            </p:cNvPicPr>
+            <p:nvPr/>
+          </p:nvPicPr>
+          <p:blipFill>
+            <a:blip r:embed="rId3"/>
+            <a:stretch>
+              <a:fillRect/>
+            </a:stretch>
+          </p:blipFill>
+          <p:spPr>
+            <a:xfrm>
+              <a:off x="310895" y="1341562"/>
+              <a:ext cx="5029200" cy="5131390"/>
+            </a:xfrm>
+            <a:prstGeom prst="rect">
+              <a:avLst/>
+            </a:prstGeom>
+          </p:spPr>
+        </p:pic>
+        <p:cxnSp>
+          <p:nvCxnSpPr>
+            <p:cNvPr id="14" name="Straight Arrow Connector 13">
+              <a:extLst>
+                <a:ext uri="{FF2B5EF4-FFF2-40B4-BE49-F238E27FC236}">
+                  <a16:creationId xmlns:a16="http://schemas.microsoft.com/office/drawing/2014/main" id="{58EF48A3-A670-FE12-C58A-D76910B9A5E8}"/>
+                </a:ext>
+              </a:extLst>
+            </p:cNvPr>
+            <p:cNvCxnSpPr>
+              <a:cxnSpLocks/>
+            </p:cNvCxnSpPr>
+            <p:nvPr/>
+          </p:nvCxnSpPr>
+          <p:spPr>
+            <a:xfrm>
+              <a:off x="2634916" y="2881563"/>
+              <a:ext cx="0" cy="1666374"/>
+            </a:xfrm>
+            <a:prstGeom prst="straightConnector1">
+              <a:avLst/>
+            </a:prstGeom>
+            <a:ln>
+              <a:tailEnd type="triangle"/>
+            </a:ln>
+          </p:spPr>
+          <p:style>
+            <a:lnRef idx="2">
+              <a:schemeClr val="accent1"/>
+            </a:lnRef>
+            <a:fillRef idx="0">
+              <a:schemeClr val="accent1"/>
+            </a:fillRef>
+            <a:effectRef idx="1">
+              <a:schemeClr val="accent1"/>
+            </a:effectRef>
+            <a:fontRef idx="minor">
+              <a:schemeClr val="tx1"/>
+            </a:fontRef>
+          </p:style>
+        </p:cxnSp>
+        <p:cxnSp>
+          <p:nvCxnSpPr>
+            <p:cNvPr id="16" name="Straight Connector 15">
+              <a:extLst>
+                <a:ext uri="{FF2B5EF4-FFF2-40B4-BE49-F238E27FC236}">
+                  <a16:creationId xmlns:a16="http://schemas.microsoft.com/office/drawing/2014/main" id="{042F0D81-B3E0-3770-8B0F-61279F7E6AEB}"/>
+                </a:ext>
+              </a:extLst>
+            </p:cNvPr>
+            <p:cNvCxnSpPr/>
+            <p:nvPr/>
+          </p:nvCxnSpPr>
+          <p:spPr>
+            <a:xfrm>
+              <a:off x="2634916" y="2881563"/>
+              <a:ext cx="3200400" cy="0"/>
+            </a:xfrm>
+            <a:prstGeom prst="line">
+              <a:avLst/>
+            </a:prstGeom>
+          </p:spPr>
+          <p:style>
+            <a:lnRef idx="2">
+              <a:schemeClr val="accent1"/>
+            </a:lnRef>
+            <a:fillRef idx="0">
+              <a:schemeClr val="accent1"/>
+            </a:fillRef>
+            <a:effectRef idx="1">
+              <a:schemeClr val="accent1"/>
+            </a:effectRef>
+            <a:fontRef idx="minor">
+              <a:schemeClr val="tx1"/>
+            </a:fontRef>
+          </p:style>
+        </p:cxnSp>
+        <p:cxnSp>
+          <p:nvCxnSpPr>
+            <p:cNvPr id="18" name="Straight Connector 17">
+              <a:extLst>
+                <a:ext uri="{FF2B5EF4-FFF2-40B4-BE49-F238E27FC236}">
+                  <a16:creationId xmlns:a16="http://schemas.microsoft.com/office/drawing/2014/main" id="{6A55BB9C-4FE7-2833-502C-D108E3DAFF66}"/>
+                </a:ext>
+              </a:extLst>
+            </p:cNvPr>
+            <p:cNvCxnSpPr>
+              <a:cxnSpLocks/>
+            </p:cNvCxnSpPr>
+            <p:nvPr/>
+          </p:nvCxnSpPr>
+          <p:spPr>
+            <a:xfrm>
+              <a:off x="5835316" y="2279984"/>
+              <a:ext cx="0" cy="982579"/>
+            </a:xfrm>
+            <a:prstGeom prst="line">
+              <a:avLst/>
+            </a:prstGeom>
+          </p:spPr>
+          <p:style>
+            <a:lnRef idx="2">
+              <a:schemeClr val="accent1"/>
+            </a:lnRef>
+            <a:fillRef idx="0">
+              <a:schemeClr val="accent1"/>
+            </a:fillRef>
+            <a:effectRef idx="1">
+              <a:schemeClr val="accent1"/>
+            </a:effectRef>
+            <a:fontRef idx="minor">
+              <a:schemeClr val="tx1"/>
+            </a:fontRef>
+          </p:style>
+        </p:cxnSp>
+        <p:cxnSp>
+          <p:nvCxnSpPr>
+            <p:cNvPr id="20" name="Straight Connector 19">
+              <a:extLst>
+                <a:ext uri="{FF2B5EF4-FFF2-40B4-BE49-F238E27FC236}">
+                  <a16:creationId xmlns:a16="http://schemas.microsoft.com/office/drawing/2014/main" id="{3189110F-3DF7-2BE7-BB94-90815AFFB4C7}"/>
+                </a:ext>
+              </a:extLst>
+            </p:cNvPr>
+            <p:cNvCxnSpPr/>
+            <p:nvPr/>
+          </p:nvCxnSpPr>
+          <p:spPr>
+            <a:xfrm>
+              <a:off x="5835316" y="2279984"/>
+              <a:ext cx="908384" cy="0"/>
+            </a:xfrm>
+            <a:prstGeom prst="line">
+              <a:avLst/>
+            </a:prstGeom>
+          </p:spPr>
+          <p:style>
+            <a:lnRef idx="2">
+              <a:schemeClr val="accent1"/>
+            </a:lnRef>
+            <a:fillRef idx="0">
+              <a:schemeClr val="accent1"/>
+            </a:fillRef>
+            <a:effectRef idx="1">
+              <a:schemeClr val="accent1"/>
+            </a:effectRef>
+            <a:fontRef idx="minor">
+              <a:schemeClr val="tx1"/>
+            </a:fontRef>
+          </p:style>
+        </p:cxnSp>
+        <p:cxnSp>
+          <p:nvCxnSpPr>
+            <p:cNvPr id="22" name="Straight Connector 21">
+              <a:extLst>
+                <a:ext uri="{FF2B5EF4-FFF2-40B4-BE49-F238E27FC236}">
+                  <a16:creationId xmlns:a16="http://schemas.microsoft.com/office/drawing/2014/main" id="{9C693BFB-EAD9-6C87-5F09-2AF4E317F6D4}"/>
+                </a:ext>
+              </a:extLst>
+            </p:cNvPr>
+            <p:cNvCxnSpPr/>
+            <p:nvPr/>
+          </p:nvCxnSpPr>
+          <p:spPr>
+            <a:xfrm>
+              <a:off x="5835316" y="3262563"/>
+              <a:ext cx="908384" cy="0"/>
+            </a:xfrm>
+            <a:prstGeom prst="line">
+              <a:avLst/>
+            </a:prstGeom>
+          </p:spPr>
+          <p:style>
+            <a:lnRef idx="2">
+              <a:schemeClr val="accent1"/>
+            </a:lnRef>
+            <a:fillRef idx="0">
+              <a:schemeClr val="accent1"/>
+            </a:fillRef>
+            <a:effectRef idx="1">
+              <a:schemeClr val="accent1"/>
+            </a:effectRef>
+            <a:fontRef idx="minor">
+              <a:schemeClr val="tx1"/>
+            </a:fontRef>
+          </p:style>
+        </p:cxnSp>
+        <p:sp>
+          <p:nvSpPr>
+            <p:cNvPr id="24" name="TextBox 23">
+              <a:extLst>
+                <a:ext uri="{FF2B5EF4-FFF2-40B4-BE49-F238E27FC236}">
+                  <a16:creationId xmlns:a16="http://schemas.microsoft.com/office/drawing/2014/main" id="{CD9B130B-CD26-890B-6224-65A456E21B28}"/>
+                </a:ext>
+              </a:extLst>
+            </p:cNvPr>
+            <p:cNvSpPr txBox="1"/>
+            <p:nvPr/>
+          </p:nvSpPr>
+          <p:spPr>
+            <a:xfrm>
+              <a:off x="6286502" y="2095318"/>
+              <a:ext cx="2364204" cy="369332"/>
+            </a:xfrm>
+            <a:prstGeom prst="rect">
+              <a:avLst/>
+            </a:prstGeom>
+            <a:noFill/>
+          </p:spPr>
+          <p:txBody>
+            <a:bodyPr wrap="square">
+              <a:spAutoFit/>
+            </a:bodyPr>
+            <a:lstStyle/>
+            <a:p>
+              <a:pPr lvl="1"/>
+              <a:r>
+                <a:rPr lang="en-US" dirty="0"/>
+                <a:t>Real New Article</a:t>
+              </a:r>
+            </a:p>
+          </p:txBody>
+        </p:sp>
+        <p:sp>
+          <p:nvSpPr>
+            <p:cNvPr id="28" name="TextBox 27">
+              <a:extLst>
+                <a:ext uri="{FF2B5EF4-FFF2-40B4-BE49-F238E27FC236}">
+                  <a16:creationId xmlns:a16="http://schemas.microsoft.com/office/drawing/2014/main" id="{39C34AAF-98F1-E4CF-DBB7-189C07F3C5F8}"/>
+                </a:ext>
+              </a:extLst>
+            </p:cNvPr>
+            <p:cNvSpPr txBox="1"/>
+            <p:nvPr/>
+          </p:nvSpPr>
+          <p:spPr>
+            <a:xfrm>
+              <a:off x="5941517" y="4060477"/>
+              <a:ext cx="3346862" cy="369332"/>
+            </a:xfrm>
+            <a:prstGeom prst="rect">
+              <a:avLst/>
+            </a:prstGeom>
+            <a:noFill/>
+          </p:spPr>
+          <p:txBody>
+            <a:bodyPr wrap="square">
+              <a:spAutoFit/>
+            </a:bodyPr>
+            <a:lstStyle/>
+            <a:p>
+              <a:pPr lvl="1"/>
+              <a:r>
+                <a:rPr lang="en-US" dirty="0"/>
+                <a:t>Twitter Key Words Only</a:t>
+              </a:r>
+            </a:p>
+          </p:txBody>
+        </p:sp>
+      </p:grpSp>
+      <p:cxnSp>
+        <p:nvCxnSpPr>
+          <p:cNvPr id="32" name="Straight Arrow Connector 31">
+            <a:extLst>
+              <a:ext uri="{FF2B5EF4-FFF2-40B4-BE49-F238E27FC236}">
+                <a16:creationId xmlns:a16="http://schemas.microsoft.com/office/drawing/2014/main" id="{E871D3B8-6CC9-9D3F-20AD-38B872D7DCE4}"/>
+              </a:ext>
+            </a:extLst>
+          </p:cNvPr>
+          <p:cNvCxnSpPr>
+            <a:cxnSpLocks/>
+          </p:cNvCxnSpPr>
+          <p:nvPr/>
+        </p:nvCxnSpPr>
+        <p:spPr>
+          <a:xfrm flipH="1">
+            <a:off x="4469732" y="4245143"/>
+            <a:ext cx="2462463" cy="0"/>
+          </a:xfrm>
+          <a:prstGeom prst="straightConnector1">
+            <a:avLst/>
+          </a:prstGeom>
+          <a:ln>
+            <a:tailEnd type="triangle"/>
+          </a:ln>
+        </p:spPr>
+        <p:style>
+          <a:lnRef idx="2">
+            <a:schemeClr val="accent2"/>
+          </a:lnRef>
+          <a:fillRef idx="0">
+            <a:schemeClr val="accent2"/>
+          </a:fillRef>
+          <a:effectRef idx="1">
+            <a:schemeClr val="accent2"/>
+          </a:effectRef>
+          <a:fontRef idx="minor">
+            <a:schemeClr val="tx1"/>
+          </a:fontRef>
+        </p:style>
+      </p:cxnSp>
+    </p:spTree>
+    <p:extLst>
+      <p:ext uri="{BB962C8B-B14F-4D97-AF65-F5344CB8AC3E}">
+        <p14:creationId xmlns:p14="http://schemas.microsoft.com/office/powerpoint/2010/main" val="170031105"/>
+      </p:ext>
+    </p:extLst>
+  </p:cSld>
+  <p:clrMapOvr>
+    <a:masterClrMapping/>
+  </p:clrMapOvr>
+</p:sld>
+</file>
+
+<file path=ppt/slides/slide12.xml><?xml version="1.0" encoding="utf-8"?>
+<p:sld xmlns:a="http://schemas.openxmlformats.org/drawingml/2006/main" xmlns:r="http://schemas.openxmlformats.org/officeDocument/2006/relationships" xmlns:p="http://schemas.openxmlformats.org/presentationml/2006/main">
+  <p:cSld>
+    <p:spTree>
+      <p:nvGrpSpPr>
+        <p:cNvPr id="1" name="">
+          <a:extLst>
+            <a:ext uri="{FF2B5EF4-FFF2-40B4-BE49-F238E27FC236}">
+              <a16:creationId xmlns:a16="http://schemas.microsoft.com/office/drawing/2014/main" id="{5FD32F76-0789-8EDC-6C50-B72EA73094E7}"/>
+            </a:ext>
+          </a:extLst>
+        </p:cNvPr>
+        <p:cNvGrpSpPr/>
+        <p:nvPr/>
+      </p:nvGrpSpPr>
+      <p:grpSpPr>
+        <a:xfrm>
+          <a:off x="0" y="0"/>
+          <a:ext cx="0" cy="0"/>
+          <a:chOff x="0" y="0"/>
+          <a:chExt cx="0" cy="0"/>
+        </a:xfrm>
+      </p:grpSpPr>
+      <p:sp>
+        <p:nvSpPr>
+          <p:cNvPr id="4" name="Flowchart: Alternate Process 3">
+            <a:extLst>
+              <a:ext uri="{FF2B5EF4-FFF2-40B4-BE49-F238E27FC236}">
+                <a16:creationId xmlns:a16="http://schemas.microsoft.com/office/drawing/2014/main" id="{9A5A0EA9-46DE-D0EF-EFC0-36761B7D194F}"/>
+              </a:ext>
+            </a:extLst>
+          </p:cNvPr>
+          <p:cNvSpPr/>
+          <p:nvPr/>
+        </p:nvSpPr>
+        <p:spPr>
+          <a:xfrm>
+            <a:off x="-103632" y="1133856"/>
+            <a:ext cx="12399264" cy="100584"/>
+          </a:xfrm>
+          <a:prstGeom prst="flowChartAlternateProcess">
+            <a:avLst/>
+          </a:prstGeom>
+          <a:solidFill>
+            <a:schemeClr val="tx2">
+              <a:lumMod val="75000"/>
+              <a:lumOff val="25000"/>
+            </a:schemeClr>
+          </a:solidFill>
+        </p:spPr>
+        <p:style>
+          <a:lnRef idx="3">
+            <a:schemeClr val="lt1"/>
+          </a:lnRef>
+          <a:fillRef idx="1">
+            <a:schemeClr val="accent1"/>
+          </a:fillRef>
+          <a:effectRef idx="1">
+            <a:schemeClr val="accent1"/>
+          </a:effectRef>
+          <a:fontRef idx="minor">
+            <a:schemeClr val="lt1"/>
+          </a:fontRef>
+        </p:style>
+        <p:txBody>
+          <a:bodyPr rtlCol="0" anchor="ctr"/>
+          <a:lstStyle/>
+          <a:p>
+            <a:pPr algn="ctr"/>
+            <a:endParaRPr lang="en-US"/>
+          </a:p>
+        </p:txBody>
+      </p:sp>
+      <p:sp>
+        <p:nvSpPr>
+          <p:cNvPr id="2" name="TextBox 1">
+            <a:extLst>
+              <a:ext uri="{FF2B5EF4-FFF2-40B4-BE49-F238E27FC236}">
+                <a16:creationId xmlns:a16="http://schemas.microsoft.com/office/drawing/2014/main" id="{374C66AC-9959-FF33-15D5-7C6E7CC37A62}"/>
+              </a:ext>
+            </a:extLst>
+          </p:cNvPr>
+          <p:cNvSpPr txBox="1"/>
+          <p:nvPr/>
+        </p:nvSpPr>
+        <p:spPr>
+          <a:xfrm>
+            <a:off x="310895" y="385048"/>
+            <a:ext cx="9196519" cy="707886"/>
+          </a:xfrm>
+          <a:prstGeom prst="rect">
+            <a:avLst/>
+          </a:prstGeom>
+          <a:noFill/>
+        </p:spPr>
+        <p:txBody>
+          <a:bodyPr wrap="square" rtlCol="0">
+            <a:spAutoFit/>
+          </a:bodyPr>
+          <a:lstStyle/>
+          <a:p>
+            <a:r>
+              <a:rPr lang="en-US" sz="4000" dirty="0">
+                <a:solidFill>
+                  <a:schemeClr val="tx2">
+                    <a:lumMod val="75000"/>
+                    <a:lumOff val="25000"/>
+                  </a:schemeClr>
+                </a:solidFill>
+                <a:latin typeface="Times New Roman" panose="02020603050405020304" pitchFamily="18" charset="0"/>
+                <a:cs typeface="Times New Roman" panose="02020603050405020304" pitchFamily="18" charset="0"/>
+              </a:rPr>
+              <a:t>6. Discussion </a:t>
+            </a:r>
+          </a:p>
+        </p:txBody>
+      </p:sp>
+      <p:sp>
+        <p:nvSpPr>
+          <p:cNvPr id="3" name="TextBox 2">
+            <a:extLst>
+              <a:ext uri="{FF2B5EF4-FFF2-40B4-BE49-F238E27FC236}">
+                <a16:creationId xmlns:a16="http://schemas.microsoft.com/office/drawing/2014/main" id="{E124072D-07C7-801B-8B62-1006E52AA00A}"/>
+              </a:ext>
+            </a:extLst>
+          </p:cNvPr>
+          <p:cNvSpPr txBox="1"/>
+          <p:nvPr/>
+        </p:nvSpPr>
+        <p:spPr>
+          <a:xfrm>
+            <a:off x="855785" y="1909135"/>
+            <a:ext cx="10245968" cy="1200329"/>
+          </a:xfrm>
+          <a:prstGeom prst="rect">
+            <a:avLst/>
+          </a:prstGeom>
+          <a:noFill/>
+        </p:spPr>
+        <p:txBody>
+          <a:bodyPr wrap="square">
+            <a:spAutoFit/>
+          </a:bodyPr>
+          <a:lstStyle/>
+          <a:p>
+            <a:pPr marL="742950" lvl="1" indent="-285750">
+              <a:lnSpc>
+                <a:spcPct val="150000"/>
+              </a:lnSpc>
               <a:buFont typeface="Wingdings" panose="05000000000000000000" pitchFamily="2" charset="2"/>
               <a:buChar char="q"/>
             </a:pPr>
+            <a:r>
+              <a:rPr lang="en-US" dirty="0"/>
+              <a:t>A dirty label attack is generally much more effective, but a lot harder to pull off. </a:t>
+            </a:r>
+          </a:p>
+          <a:p>
+            <a:pPr marL="1257300" lvl="2" indent="-342900">
+              <a:lnSpc>
+                <a:spcPct val="150000"/>
+              </a:lnSpc>
+              <a:buFont typeface="+mj-lt"/>
+              <a:buAutoNum type="arabicPeriod"/>
+            </a:pPr>
             <a:endParaRPr lang="en-US" dirty="0"/>
+          </a:p>
+          <a:p>
+            <a:pPr marL="1257300" lvl="2" indent="-342900">
+              <a:buFont typeface="+mj-lt"/>
+              <a:buAutoNum type="arabicPeriod"/>
+            </a:pPr>
+            <a:endParaRPr lang="en-US" dirty="0"/>
+          </a:p>
+        </p:txBody>
+      </p:sp>
+      <p:graphicFrame>
+        <p:nvGraphicFramePr>
+          <p:cNvPr id="7" name="Table 6">
+            <a:extLst>
+              <a:ext uri="{FF2B5EF4-FFF2-40B4-BE49-F238E27FC236}">
+                <a16:creationId xmlns:a16="http://schemas.microsoft.com/office/drawing/2014/main" id="{A4079371-4683-3C87-AD98-83B6E31E86CA}"/>
+              </a:ext>
+            </a:extLst>
+          </p:cNvPr>
+          <p:cNvGraphicFramePr>
+            <a:graphicFrameLocks noGrp="1"/>
+          </p:cNvGraphicFramePr>
+          <p:nvPr>
+            <p:extLst>
+              <p:ext uri="{D42A27DB-BD31-4B8C-83A1-F6EECF244321}">
+                <p14:modId xmlns:p14="http://schemas.microsoft.com/office/powerpoint/2010/main" val="3152310728"/>
+              </p:ext>
+            </p:extLst>
+          </p:nvPr>
+        </p:nvGraphicFramePr>
+        <p:xfrm>
+          <a:off x="1379415" y="3109464"/>
+          <a:ext cx="8127999" cy="2225040"/>
+        </p:xfrm>
+        <a:graphic>
+          <a:graphicData uri="http://schemas.openxmlformats.org/drawingml/2006/table">
+            <a:tbl>
+              <a:tblPr firstRow="1" bandRow="1">
+                <a:tableStyleId>{5C22544A-7EE6-4342-B048-85BDC9FD1C3A}</a:tableStyleId>
+              </a:tblPr>
+              <a:tblGrid>
+                <a:gridCol w="2709333">
+                  <a:extLst>
+                    <a:ext uri="{9D8B030D-6E8A-4147-A177-3AD203B41FA5}">
+                      <a16:colId xmlns:a16="http://schemas.microsoft.com/office/drawing/2014/main" val="1148984925"/>
+                    </a:ext>
+                  </a:extLst>
+                </a:gridCol>
+                <a:gridCol w="2709333">
+                  <a:extLst>
+                    <a:ext uri="{9D8B030D-6E8A-4147-A177-3AD203B41FA5}">
+                      <a16:colId xmlns:a16="http://schemas.microsoft.com/office/drawing/2014/main" val="320492414"/>
+                    </a:ext>
+                  </a:extLst>
+                </a:gridCol>
+                <a:gridCol w="2709333">
+                  <a:extLst>
+                    <a:ext uri="{9D8B030D-6E8A-4147-A177-3AD203B41FA5}">
+                      <a16:colId xmlns:a16="http://schemas.microsoft.com/office/drawing/2014/main" val="3951299744"/>
+                    </a:ext>
+                  </a:extLst>
+                </a:gridCol>
+              </a:tblGrid>
+              <a:tr h="370840">
+                <a:tc>
+                  <a:txBody>
+                    <a:bodyPr/>
+                    <a:lstStyle/>
+                    <a:p>
+                      <a:pPr algn="ctr"/>
+                      <a:r>
+                        <a:rPr lang="en-US" dirty="0"/>
+                        <a:t>Poisoned Percentage</a:t>
+                      </a:r>
+                    </a:p>
+                  </a:txBody>
+                  <a:tcPr/>
+                </a:tc>
+                <a:tc>
+                  <a:txBody>
+                    <a:bodyPr/>
+                    <a:lstStyle/>
+                    <a:p>
+                      <a:pPr algn="ctr"/>
+                      <a:r>
+                        <a:rPr lang="en-US" dirty="0"/>
+                        <a:t>Observed Accuracy</a:t>
+                      </a:r>
+                    </a:p>
+                  </a:txBody>
+                  <a:tcPr/>
+                </a:tc>
+                <a:tc>
+                  <a:txBody>
+                    <a:bodyPr/>
+                    <a:lstStyle/>
+                    <a:p>
+                      <a:pPr algn="ctr"/>
+                      <a:r>
+                        <a:rPr lang="en-US" dirty="0"/>
+                        <a:t>Flip Rate</a:t>
+                      </a:r>
+                    </a:p>
+                  </a:txBody>
+                  <a:tcPr/>
+                </a:tc>
+                <a:extLst>
+                  <a:ext uri="{0D108BD9-81ED-4DB2-BD59-A6C34878D82A}">
+                    <a16:rowId xmlns:a16="http://schemas.microsoft.com/office/drawing/2014/main" val="805670392"/>
+                  </a:ext>
+                </a:extLst>
+              </a:tr>
+              <a:tr h="370840">
+                <a:tc>
+                  <a:txBody>
+                    <a:bodyPr/>
+                    <a:lstStyle/>
+                    <a:p>
+                      <a:pPr algn="ctr"/>
+                      <a:r>
+                        <a:rPr lang="en-US" dirty="0"/>
+                        <a:t>0%</a:t>
+                      </a:r>
+                    </a:p>
+                  </a:txBody>
+                  <a:tcPr/>
+                </a:tc>
+                <a:tc>
+                  <a:txBody>
+                    <a:bodyPr/>
+                    <a:lstStyle/>
+                    <a:p>
+                      <a:pPr algn="ctr"/>
+                      <a:r>
+                        <a:rPr lang="en-US" dirty="0"/>
+                        <a:t>99.98%</a:t>
+                      </a:r>
+                    </a:p>
+                  </a:txBody>
+                  <a:tcPr/>
+                </a:tc>
+                <a:tc>
+                  <a:txBody>
+                    <a:bodyPr/>
+                    <a:lstStyle/>
+                    <a:p>
+                      <a:pPr algn="ctr"/>
+                      <a:r>
+                        <a:rPr lang="en-US" dirty="0"/>
+                        <a:t>0.00%</a:t>
+                      </a:r>
+                    </a:p>
+                  </a:txBody>
+                  <a:tcPr/>
+                </a:tc>
+                <a:extLst>
+                  <a:ext uri="{0D108BD9-81ED-4DB2-BD59-A6C34878D82A}">
+                    <a16:rowId xmlns:a16="http://schemas.microsoft.com/office/drawing/2014/main" val="2306406236"/>
+                  </a:ext>
+                </a:extLst>
+              </a:tr>
+              <a:tr h="370840">
+                <a:tc>
+                  <a:txBody>
+                    <a:bodyPr/>
+                    <a:lstStyle/>
+                    <a:p>
+                      <a:pPr algn="ctr"/>
+                      <a:r>
+                        <a:rPr lang="en-US" dirty="0"/>
+                        <a:t>25%</a:t>
+                      </a:r>
+                    </a:p>
+                  </a:txBody>
+                  <a:tcPr/>
+                </a:tc>
+                <a:tc>
+                  <a:txBody>
+                    <a:bodyPr/>
+                    <a:lstStyle/>
+                    <a:p>
+                      <a:pPr algn="ctr"/>
+                      <a:r>
+                        <a:rPr lang="en-US" dirty="0"/>
+                        <a:t>99.71%</a:t>
+                      </a:r>
+                    </a:p>
+                  </a:txBody>
+                  <a:tcPr/>
+                </a:tc>
+                <a:tc>
+                  <a:txBody>
+                    <a:bodyPr/>
+                    <a:lstStyle/>
+                    <a:p>
+                      <a:pPr algn="ctr"/>
+                      <a:r>
+                        <a:rPr lang="en-US" dirty="0"/>
+                        <a:t>0.00%</a:t>
+                      </a:r>
+                    </a:p>
+                  </a:txBody>
+                  <a:tcPr/>
+                </a:tc>
+                <a:extLst>
+                  <a:ext uri="{0D108BD9-81ED-4DB2-BD59-A6C34878D82A}">
+                    <a16:rowId xmlns:a16="http://schemas.microsoft.com/office/drawing/2014/main" val="1800218523"/>
+                  </a:ext>
+                </a:extLst>
+              </a:tr>
+              <a:tr h="370840">
+                <a:tc>
+                  <a:txBody>
+                    <a:bodyPr/>
+                    <a:lstStyle/>
+                    <a:p>
+                      <a:pPr algn="ctr"/>
+                      <a:r>
+                        <a:rPr lang="en-US" dirty="0"/>
+                        <a:t>50%</a:t>
+                      </a:r>
+                    </a:p>
+                  </a:txBody>
+                  <a:tcPr/>
+                </a:tc>
+                <a:tc>
+                  <a:txBody>
+                    <a:bodyPr/>
+                    <a:lstStyle/>
+                    <a:p>
+                      <a:pPr algn="ctr"/>
+                      <a:r>
+                        <a:rPr lang="en-US" dirty="0"/>
+                        <a:t>99.20%</a:t>
+                      </a:r>
+                    </a:p>
+                  </a:txBody>
+                  <a:tcPr/>
+                </a:tc>
+                <a:tc>
+                  <a:txBody>
+                    <a:bodyPr/>
+                    <a:lstStyle/>
+                    <a:p>
+                      <a:pPr algn="ctr"/>
+                      <a:r>
+                        <a:rPr lang="en-US" dirty="0"/>
+                        <a:t>0.00%</a:t>
+                      </a:r>
+                    </a:p>
+                  </a:txBody>
+                  <a:tcPr/>
+                </a:tc>
+                <a:extLst>
+                  <a:ext uri="{0D108BD9-81ED-4DB2-BD59-A6C34878D82A}">
+                    <a16:rowId xmlns:a16="http://schemas.microsoft.com/office/drawing/2014/main" val="1686400256"/>
+                  </a:ext>
+                </a:extLst>
+              </a:tr>
+              <a:tr h="370840">
+                <a:tc>
+                  <a:txBody>
+                    <a:bodyPr/>
+                    <a:lstStyle/>
+                    <a:p>
+                      <a:pPr algn="ctr"/>
+                      <a:r>
+                        <a:rPr lang="en-US" dirty="0"/>
+                        <a:t>75%</a:t>
+                      </a:r>
+                    </a:p>
+                  </a:txBody>
+                  <a:tcPr/>
+                </a:tc>
+                <a:tc>
+                  <a:txBody>
+                    <a:bodyPr/>
+                    <a:lstStyle/>
+                    <a:p>
+                      <a:pPr algn="ctr"/>
+                      <a:r>
+                        <a:rPr lang="en-US" dirty="0"/>
+                        <a:t>98.88%</a:t>
+                      </a:r>
+                    </a:p>
+                  </a:txBody>
+                  <a:tcPr/>
+                </a:tc>
+                <a:tc>
+                  <a:txBody>
+                    <a:bodyPr/>
+                    <a:lstStyle/>
+                    <a:p>
+                      <a:pPr algn="ctr"/>
+                      <a:r>
+                        <a:rPr lang="en-US" dirty="0"/>
+                        <a:t>1.03%</a:t>
+                      </a:r>
+                    </a:p>
+                  </a:txBody>
+                  <a:tcPr/>
+                </a:tc>
+                <a:extLst>
+                  <a:ext uri="{0D108BD9-81ED-4DB2-BD59-A6C34878D82A}">
+                    <a16:rowId xmlns:a16="http://schemas.microsoft.com/office/drawing/2014/main" val="3138945154"/>
+                  </a:ext>
+                </a:extLst>
+              </a:tr>
+              <a:tr h="370840">
+                <a:tc>
+                  <a:txBody>
+                    <a:bodyPr/>
+                    <a:lstStyle/>
+                    <a:p>
+                      <a:pPr algn="ctr"/>
+                      <a:r>
+                        <a:rPr lang="en-US" dirty="0"/>
+                        <a:t>100%</a:t>
+                      </a:r>
+                    </a:p>
+                  </a:txBody>
+                  <a:tcPr/>
+                </a:tc>
+                <a:tc>
+                  <a:txBody>
+                    <a:bodyPr/>
+                    <a:lstStyle/>
+                    <a:p>
+                      <a:pPr algn="ctr"/>
+                      <a:r>
+                        <a:rPr lang="en-US" dirty="0"/>
+                        <a:t>98.00%</a:t>
+                      </a:r>
+                    </a:p>
+                  </a:txBody>
+                  <a:tcPr/>
+                </a:tc>
+                <a:tc>
+                  <a:txBody>
+                    <a:bodyPr/>
+                    <a:lstStyle/>
+                    <a:p>
+                      <a:pPr algn="ctr"/>
+                      <a:r>
+                        <a:rPr lang="en-US" dirty="0"/>
+                        <a:t>68.12%</a:t>
+                      </a:r>
+                    </a:p>
+                  </a:txBody>
+                  <a:tcPr/>
+                </a:tc>
+                <a:extLst>
+                  <a:ext uri="{0D108BD9-81ED-4DB2-BD59-A6C34878D82A}">
+                    <a16:rowId xmlns:a16="http://schemas.microsoft.com/office/drawing/2014/main" val="1713406975"/>
+                  </a:ext>
+                </a:extLst>
+              </a:tr>
+            </a:tbl>
+          </a:graphicData>
+        </a:graphic>
+      </p:graphicFrame>
+    </p:spTree>
+    <p:extLst>
+      <p:ext uri="{BB962C8B-B14F-4D97-AF65-F5344CB8AC3E}">
+        <p14:creationId xmlns:p14="http://schemas.microsoft.com/office/powerpoint/2010/main" val="3822410300"/>
+      </p:ext>
+    </p:extLst>
+  </p:cSld>
+  <p:clrMapOvr>
+    <a:masterClrMapping/>
+  </p:clrMapOvr>
+</p:sld>
+</file>
+
+<file path=ppt/slides/slide13.xml><?xml version="1.0" encoding="utf-8"?>
+<p:sld xmlns:a="http://schemas.openxmlformats.org/drawingml/2006/main" xmlns:r="http://schemas.openxmlformats.org/officeDocument/2006/relationships" xmlns:p="http://schemas.openxmlformats.org/presentationml/2006/main">
+  <p:cSld>
+    <p:spTree>
+      <p:nvGrpSpPr>
+        <p:cNvPr id="1" name="">
+          <a:extLst>
+            <a:ext uri="{FF2B5EF4-FFF2-40B4-BE49-F238E27FC236}">
+              <a16:creationId xmlns:a16="http://schemas.microsoft.com/office/drawing/2014/main" id="{AA045A3B-F4A8-FD0A-C81A-05DC1801D824}"/>
+            </a:ext>
+          </a:extLst>
+        </p:cNvPr>
+        <p:cNvGrpSpPr/>
+        <p:nvPr/>
+      </p:nvGrpSpPr>
+      <p:grpSpPr>
+        <a:xfrm>
+          <a:off x="0" y="0"/>
+          <a:ext cx="0" cy="0"/>
+          <a:chOff x="0" y="0"/>
+          <a:chExt cx="0" cy="0"/>
+        </a:xfrm>
+      </p:grpSpPr>
+      <p:sp>
+        <p:nvSpPr>
+          <p:cNvPr id="4" name="Flowchart: Alternate Process 3">
+            <a:extLst>
+              <a:ext uri="{FF2B5EF4-FFF2-40B4-BE49-F238E27FC236}">
+                <a16:creationId xmlns:a16="http://schemas.microsoft.com/office/drawing/2014/main" id="{45AE1CE2-D135-21B7-133E-80AAEA33FCD1}"/>
+              </a:ext>
+            </a:extLst>
+          </p:cNvPr>
+          <p:cNvSpPr/>
+          <p:nvPr/>
+        </p:nvSpPr>
+        <p:spPr>
+          <a:xfrm>
+            <a:off x="-103632" y="1133856"/>
+            <a:ext cx="12399264" cy="100584"/>
+          </a:xfrm>
+          <a:prstGeom prst="flowChartAlternateProcess">
+            <a:avLst/>
+          </a:prstGeom>
+          <a:solidFill>
+            <a:schemeClr val="tx2">
+              <a:lumMod val="75000"/>
+              <a:lumOff val="25000"/>
+            </a:schemeClr>
+          </a:solidFill>
+        </p:spPr>
+        <p:style>
+          <a:lnRef idx="3">
+            <a:schemeClr val="lt1"/>
+          </a:lnRef>
+          <a:fillRef idx="1">
+            <a:schemeClr val="accent1"/>
+          </a:fillRef>
+          <a:effectRef idx="1">
+            <a:schemeClr val="accent1"/>
+          </a:effectRef>
+          <a:fontRef idx="minor">
+            <a:schemeClr val="lt1"/>
+          </a:fontRef>
+        </p:style>
+        <p:txBody>
+          <a:bodyPr rtlCol="0" anchor="ctr"/>
+          <a:lstStyle/>
+          <a:p>
+            <a:pPr algn="ctr"/>
+            <a:endParaRPr lang="en-US"/>
+          </a:p>
+        </p:txBody>
+      </p:sp>
+      <p:sp>
+        <p:nvSpPr>
+          <p:cNvPr id="2" name="TextBox 1">
+            <a:extLst>
+              <a:ext uri="{FF2B5EF4-FFF2-40B4-BE49-F238E27FC236}">
+                <a16:creationId xmlns:a16="http://schemas.microsoft.com/office/drawing/2014/main" id="{BE40BDDB-8AFD-7F5B-6160-EF634F79D653}"/>
+              </a:ext>
+            </a:extLst>
+          </p:cNvPr>
+          <p:cNvSpPr txBox="1"/>
+          <p:nvPr/>
+        </p:nvSpPr>
+        <p:spPr>
+          <a:xfrm>
+            <a:off x="310895" y="385048"/>
+            <a:ext cx="9196519" cy="707886"/>
+          </a:xfrm>
+          <a:prstGeom prst="rect">
+            <a:avLst/>
+          </a:prstGeom>
+          <a:noFill/>
+        </p:spPr>
+        <p:txBody>
+          <a:bodyPr wrap="square" rtlCol="0">
+            <a:spAutoFit/>
+          </a:bodyPr>
+          <a:lstStyle/>
+          <a:p>
+            <a:r>
+              <a:rPr lang="en-US" sz="4000" dirty="0">
+                <a:solidFill>
+                  <a:schemeClr val="tx2">
+                    <a:lumMod val="75000"/>
+                    <a:lumOff val="25000"/>
+                  </a:schemeClr>
+                </a:solidFill>
+                <a:latin typeface="Times New Roman" panose="02020603050405020304" pitchFamily="18" charset="0"/>
+                <a:cs typeface="Times New Roman" panose="02020603050405020304" pitchFamily="18" charset="0"/>
+              </a:rPr>
+              <a:t>7. Conclusion</a:t>
+            </a:r>
+          </a:p>
+        </p:txBody>
+      </p:sp>
+      <p:sp>
+        <p:nvSpPr>
+          <p:cNvPr id="11" name="TextBox 10">
+            <a:extLst>
+              <a:ext uri="{FF2B5EF4-FFF2-40B4-BE49-F238E27FC236}">
+                <a16:creationId xmlns:a16="http://schemas.microsoft.com/office/drawing/2014/main" id="{9F2B87C2-23AC-C8A1-8A38-AE716785EA16}"/>
+              </a:ext>
+            </a:extLst>
+          </p:cNvPr>
+          <p:cNvSpPr txBox="1"/>
+          <p:nvPr/>
+        </p:nvSpPr>
+        <p:spPr>
+          <a:xfrm>
+            <a:off x="679939" y="1745012"/>
+            <a:ext cx="10245968" cy="4247317"/>
+          </a:xfrm>
+          <a:prstGeom prst="rect">
+            <a:avLst/>
+          </a:prstGeom>
+          <a:noFill/>
+        </p:spPr>
+        <p:txBody>
+          <a:bodyPr wrap="square">
+            <a:spAutoFit/>
+          </a:bodyPr>
+          <a:lstStyle/>
+          <a:p>
+            <a:pPr marL="285750" indent="-285750">
+              <a:buFont typeface="Arial" panose="020B0604020202020204" pitchFamily="34" charset="0"/>
+              <a:buChar char="•"/>
+            </a:pPr>
+            <a:r>
+              <a:rPr lang="en-US" dirty="0"/>
+              <a:t>Our findings highlight the resilience of fine-tuned BERT models against biased data. Despite various attempts to manipulate its predictions by using synthetic data or targeted pre-training, the model maintained high accuracy in distinguishing fake news from real news. This suggests that the model’s representations are distributed and robust, making them less susceptible to superficial modifications in the data.</a:t>
+            </a:r>
+          </a:p>
+          <a:p>
+            <a:pPr marL="285750" indent="-285750">
+              <a:buFont typeface="Arial" panose="020B0604020202020204" pitchFamily="34" charset="0"/>
+              <a:buChar char="•"/>
+            </a:pPr>
+            <a:endParaRPr lang="en-US" dirty="0"/>
+          </a:p>
+          <a:p>
+            <a:pPr marL="285750" indent="-285750">
+              <a:buFont typeface="Arial" panose="020B0604020202020204" pitchFamily="34" charset="0"/>
+              <a:buChar char="•"/>
+            </a:pPr>
+            <a:endParaRPr lang="en-US" dirty="0"/>
+          </a:p>
+          <a:p>
+            <a:pPr marL="285750" indent="-285750">
+              <a:buFont typeface="Arial" panose="020B0604020202020204" pitchFamily="34" charset="0"/>
+              <a:buChar char="•"/>
+            </a:pPr>
+            <a:r>
+              <a:rPr lang="en-US" dirty="0"/>
+              <a:t>Potential directions for future research:</a:t>
+            </a:r>
           </a:p>
           <a:p>
             <a:pPr marL="742950" lvl="1" indent="-285750">
@@ -5138,18 +6771,39 @@
             </a:pPr>
             <a:r>
               <a:rPr lang="en-US" dirty="0"/>
-              <a:t>Contextual embedding interference: creating adversarial examples by modifying the context around influential words or phrases. For example, embedding fake news terms within real news contexts and observing changes in predictions.</a:t>
-            </a:r>
-          </a:p>
-          <a:p>
-            <a:pPr marL="285750" indent="-285750">
+              <a:t>Simultaneous adversarial training for biased text generation.</a:t>
+            </a:r>
+          </a:p>
+          <a:p>
+            <a:pPr lvl="1"/>
+            <a:endParaRPr lang="en-US" dirty="0"/>
+          </a:p>
+          <a:p>
+            <a:pPr marL="742950" lvl="1" indent="-285750">
               <a:buFont typeface="Wingdings" panose="05000000000000000000" pitchFamily="2" charset="2"/>
               <a:buChar char="q"/>
             </a:pPr>
+            <a:r>
+              <a:rPr lang="en-US" dirty="0"/>
+              <a:t>Reverse engineering pre-training procedures to determine if the placement of biased phrases effect how much the embeddings change. </a:t>
+            </a:r>
+          </a:p>
+          <a:p>
+            <a:pPr marL="742950" lvl="1" indent="-285750">
+              <a:buFont typeface="Wingdings" panose="05000000000000000000" pitchFamily="2" charset="2"/>
+              <a:buChar char="q"/>
+            </a:pPr>
             <a:endParaRPr lang="en-US" dirty="0"/>
           </a:p>
           <a:p>
-            <a:pPr marL="285750" indent="-285750">
+            <a:pPr marL="742950" lvl="1" indent="-285750">
+              <a:buFont typeface="Wingdings" panose="05000000000000000000" pitchFamily="2" charset="2"/>
+              <a:buChar char="q"/>
+            </a:pPr>
+            <a:endParaRPr lang="en-US" dirty="0"/>
+          </a:p>
+          <a:p>
+            <a:pPr marL="742950" lvl="1" indent="-285750">
               <a:buFont typeface="Arial" panose="020B0604020202020204" pitchFamily="34" charset="0"/>
               <a:buChar char="•"/>
             </a:pPr>

</xml_diff>